<commit_message>
update: added standup files and header for  website
</commit_message>
<xml_diff>
--- a/standup/slides_standup2.pptx
+++ b/standup/slides_standup2.pptx
@@ -223,7 +223,7 @@
           <a:p>
             <a:fld id="{8CCBB0D6-6D06-4BD3-AB31-E8869D874B02}" type="datetimeFigureOut">
               <a:rPr lang="en-US" smtClean="0"/>
-              <a:t>10/30/2022</a:t>
+              <a:t>11/1/2022</a:t>
             </a:fld>
             <a:endParaRPr lang="en-US"/>
           </a:p>
@@ -388,7 +388,7 @@
           <a:p>
             <a:fld id="{91E409EA-C7DB-44FA-89E8-1410E2A9549A}" type="datetimeFigureOut">
               <a:rPr lang="en-US" smtClean="0"/>
-              <a:t>10/30/2022</a:t>
+              <a:t>11/1/2022</a:t>
             </a:fld>
             <a:endParaRPr lang="en-US"/>
           </a:p>
@@ -826,7 +826,7 @@
           <a:p>
             <a:fld id="{E33B2A8E-2924-46CB-8A3D-E6C838C23300}" type="datetimeFigureOut">
               <a:rPr lang="en-US" smtClean="0"/>
-              <a:t>10/30/2022</a:t>
+              <a:t>11/1/2022</a:t>
             </a:fld>
             <a:endParaRPr lang="en-US"/>
           </a:p>
@@ -1155,7 +1155,7 @@
             <a:fld id="{E33B2A8E-2924-46CB-8A3D-E6C838C23300}" type="datetimeFigureOut">
               <a:rPr lang="en-US" smtClean="0"/>
               <a:pPr/>
-              <a:t>10/30/2022</a:t>
+              <a:t>11/1/2022</a:t>
             </a:fld>
             <a:endParaRPr lang="en-US"/>
           </a:p>
@@ -1383,7 +1383,7 @@
             <a:fld id="{E33B2A8E-2924-46CB-8A3D-E6C838C23300}" type="datetimeFigureOut">
               <a:rPr lang="en-US" smtClean="0"/>
               <a:pPr/>
-              <a:t>10/30/2022</a:t>
+              <a:t>11/1/2022</a:t>
             </a:fld>
             <a:endParaRPr lang="en-US"/>
           </a:p>
@@ -1680,7 +1680,7 @@
             <a:fld id="{E33B2A8E-2924-46CB-8A3D-E6C838C23300}" type="datetimeFigureOut">
               <a:rPr lang="en-US" smtClean="0"/>
               <a:pPr/>
-              <a:t>10/30/2022</a:t>
+              <a:t>11/1/2022</a:t>
             </a:fld>
             <a:endParaRPr lang="en-US"/>
           </a:p>
@@ -2140,7 +2140,7 @@
             <a:fld id="{E33B2A8E-2924-46CB-8A3D-E6C838C23300}" type="datetimeFigureOut">
               <a:rPr lang="en-US" smtClean="0"/>
               <a:pPr/>
-              <a:t>10/30/2022</a:t>
+              <a:t>11/1/2022</a:t>
             </a:fld>
             <a:endParaRPr lang="en-US"/>
           </a:p>
@@ -2722,7 +2722,7 @@
             <a:fld id="{E33B2A8E-2924-46CB-8A3D-E6C838C23300}" type="datetimeFigureOut">
               <a:rPr lang="en-US" smtClean="0"/>
               <a:pPr/>
-              <a:t>10/30/2022</a:t>
+              <a:t>11/1/2022</a:t>
             </a:fld>
             <a:endParaRPr lang="en-US"/>
           </a:p>
@@ -3580,7 +3580,7 @@
             <a:fld id="{E33B2A8E-2924-46CB-8A3D-E6C838C23300}" type="datetimeFigureOut">
               <a:rPr lang="en-US" smtClean="0"/>
               <a:pPr/>
-              <a:t>10/30/2022</a:t>
+              <a:t>11/1/2022</a:t>
             </a:fld>
             <a:endParaRPr lang="en-US"/>
           </a:p>
@@ -3791,7 +3791,7 @@
             <a:fld id="{E33B2A8E-2924-46CB-8A3D-E6C838C23300}" type="datetimeFigureOut">
               <a:rPr lang="en-US" smtClean="0"/>
               <a:pPr/>
-              <a:t>10/30/2022</a:t>
+              <a:t>11/1/2022</a:t>
             </a:fld>
             <a:endParaRPr lang="en-US"/>
           </a:p>
@@ -4011,7 +4011,7 @@
             <a:fld id="{E33B2A8E-2924-46CB-8A3D-E6C838C23300}" type="datetimeFigureOut">
               <a:rPr lang="en-US" smtClean="0"/>
               <a:pPr/>
-              <a:t>10/30/2022</a:t>
+              <a:t>11/1/2022</a:t>
             </a:fld>
             <a:endParaRPr lang="en-US"/>
           </a:p>
@@ -4186,7 +4186,7 @@
           <a:p>
             <a:fld id="{E33B2A8E-2924-46CB-8A3D-E6C838C23300}" type="datetimeFigureOut">
               <a:rPr lang="en-US" smtClean="0"/>
-              <a:t>10/30/2022</a:t>
+              <a:t>11/1/2022</a:t>
             </a:fld>
             <a:endParaRPr lang="en-US"/>
           </a:p>
@@ -4408,7 +4408,7 @@
             <a:fld id="{E33B2A8E-2924-46CB-8A3D-E6C838C23300}" type="datetimeFigureOut">
               <a:rPr lang="en-US" smtClean="0"/>
               <a:pPr/>
-              <a:t>10/30/2022</a:t>
+              <a:t>11/1/2022</a:t>
             </a:fld>
             <a:endParaRPr lang="en-US"/>
           </a:p>
@@ -4693,7 +4693,7 @@
           <a:p>
             <a:fld id="{E33B2A8E-2924-46CB-8A3D-E6C838C23300}" type="datetimeFigureOut">
               <a:rPr lang="en-US" smtClean="0"/>
-              <a:t>10/30/2022</a:t>
+              <a:t>11/1/2022</a:t>
             </a:fld>
             <a:endParaRPr lang="en-US"/>
           </a:p>
@@ -4977,7 +4977,7 @@
             <a:fld id="{E33B2A8E-2924-46CB-8A3D-E6C838C23300}" type="datetimeFigureOut">
               <a:rPr lang="en-US" smtClean="0"/>
               <a:pPr/>
-              <a:t>10/30/2022</a:t>
+              <a:t>11/1/2022</a:t>
             </a:fld>
             <a:endParaRPr lang="en-US"/>
           </a:p>
@@ -5398,7 +5398,7 @@
             <a:fld id="{E33B2A8E-2924-46CB-8A3D-E6C838C23300}" type="datetimeFigureOut">
               <a:rPr lang="en-US" smtClean="0"/>
               <a:pPr/>
-              <a:t>10/30/2022</a:t>
+              <a:t>11/1/2022</a:t>
             </a:fld>
             <a:endParaRPr lang="en-US"/>
           </a:p>
@@ -5551,7 +5551,7 @@
           <a:p>
             <a:fld id="{E33B2A8E-2924-46CB-8A3D-E6C838C23300}" type="datetimeFigureOut">
               <a:rPr lang="en-US" smtClean="0"/>
-              <a:t>10/30/2022</a:t>
+              <a:t>11/1/2022</a:t>
             </a:fld>
             <a:endParaRPr lang="en-US"/>
           </a:p>
@@ -5692,7 +5692,7 @@
           <a:p>
             <a:fld id="{E33B2A8E-2924-46CB-8A3D-E6C838C23300}" type="datetimeFigureOut">
               <a:rPr lang="en-US" smtClean="0"/>
-              <a:t>10/30/2022</a:t>
+              <a:t>11/1/2022</a:t>
             </a:fld>
             <a:endParaRPr lang="en-US"/>
           </a:p>
@@ -5988,7 +5988,7 @@
             <a:fld id="{E33B2A8E-2924-46CB-8A3D-E6C838C23300}" type="datetimeFigureOut">
               <a:rPr lang="en-US" smtClean="0"/>
               <a:pPr/>
-              <a:t>10/30/2022</a:t>
+              <a:t>11/1/2022</a:t>
             </a:fld>
             <a:endParaRPr lang="en-US"/>
           </a:p>
@@ -6305,7 +6305,7 @@
           <a:p>
             <a:fld id="{E33B2A8E-2924-46CB-8A3D-E6C838C23300}" type="datetimeFigureOut">
               <a:rPr lang="en-US" smtClean="0"/>
-              <a:t>10/30/2022</a:t>
+              <a:t>11/1/2022</a:t>
             </a:fld>
             <a:endParaRPr lang="en-US"/>
           </a:p>
@@ -6575,7 +6575,7 @@
             <a:fld id="{E33B2A8E-2924-46CB-8A3D-E6C838C23300}" type="datetimeFigureOut">
               <a:rPr lang="en-US" smtClean="0"/>
               <a:pPr/>
-              <a:t>10/30/2022</a:t>
+              <a:t>11/1/2022</a:t>
             </a:fld>
             <a:endParaRPr lang="en-US"/>
           </a:p>
@@ -8499,6 +8499,36 @@
           </a:p>
         </p:txBody>
       </p:sp>
+      <p:pic>
+        <p:nvPicPr>
+          <p:cNvPr id="3" name="Picture 2">
+            <a:extLst>
+              <a:ext uri="{FF2B5EF4-FFF2-40B4-BE49-F238E27FC236}">
+                <a16:creationId xmlns:a16="http://schemas.microsoft.com/office/drawing/2014/main" id="{B92FA804-5E08-88DA-56D4-8DAF4BEABB11}"/>
+              </a:ext>
+            </a:extLst>
+          </p:cNvPr>
+          <p:cNvPicPr>
+            <a:picLocks noChangeAspect="1"/>
+          </p:cNvPicPr>
+          <p:nvPr/>
+        </p:nvPicPr>
+        <p:blipFill>
+          <a:blip r:embed="rId2"/>
+          <a:stretch>
+            <a:fillRect/>
+          </a:stretch>
+        </p:blipFill>
+        <p:spPr>
+          <a:xfrm>
+            <a:off x="6360480" y="1898180"/>
+            <a:ext cx="3444340" cy="4341303"/>
+          </a:xfrm>
+          <a:prstGeom prst="rect">
+            <a:avLst/>
+          </a:prstGeom>
+        </p:spPr>
+      </p:pic>
     </p:spTree>
     <p:extLst>
       <p:ext uri="{BB962C8B-B14F-4D97-AF65-F5344CB8AC3E}">

</xml_diff>